<commit_message>
updated the flow chart
</commit_message>
<xml_diff>
--- a/reference/process diagram.pptx
+++ b/reference/process diagram.pptx
@@ -104,6 +104,11 @@
       </a:defRPr>
     </a:lvl9pPr>
   </p:defaultTextStyle>
+  <p:extLst>
+    <p:ext uri="{EFAFB233-063F-42B5-8137-9DF3F51BA10A}">
+      <p15:sldGuideLst xmlns:p15="http://schemas.microsoft.com/office/powerpoint/2012/main"/>
+    </p:ext>
+  </p:extLst>
 </p:presentation>
 </file>
 
@@ -3335,7 +3340,7 @@
         </p:nvSpPr>
         <p:spPr>
           <a:xfrm>
-            <a:off x="2890526" y="1673902"/>
+            <a:off x="2025728" y="1673901"/>
             <a:ext cx="1518749" cy="369332"/>
           </a:xfrm>
           <a:prstGeom prst="rect">
@@ -3391,7 +3396,7 @@
         </p:nvCxnSpPr>
         <p:spPr>
           <a:xfrm flipH="1">
-            <a:off x="3649900" y="2043234"/>
+            <a:off x="2785102" y="2043233"/>
             <a:ext cx="1" cy="206337"/>
           </a:xfrm>
           <a:prstGeom prst="straightConnector1">
@@ -3528,8 +3533,8 @@
         </p:nvCxnSpPr>
         <p:spPr>
           <a:xfrm rot="10800000" flipV="1">
-            <a:off x="3649901" y="1294874"/>
-            <a:ext cx="292684" cy="293415"/>
+            <a:off x="2785103" y="1294875"/>
+            <a:ext cx="1157482" cy="293414"/>
           </a:xfrm>
           <a:prstGeom prst="bentConnector2">
             <a:avLst/>
@@ -3569,7 +3574,7 @@
             </p:nvSpPr>
             <p:spPr>
               <a:xfrm>
-                <a:off x="2815107" y="2249571"/>
+                <a:off x="1950309" y="2249570"/>
                 <a:ext cx="1669585" cy="923330"/>
               </a:xfrm>
               <a:prstGeom prst="rect">
@@ -3697,7 +3702,7 @@
             </p:nvSpPr>
             <p:spPr>
               <a:xfrm>
-                <a:off x="2815107" y="2249571"/>
+                <a:off x="1950309" y="2249570"/>
                 <a:ext cx="1669585" cy="923330"/>
               </a:xfrm>
               <a:prstGeom prst="rect">
@@ -3826,8 +3831,8 @@
         </p:nvSpPr>
         <p:spPr>
           <a:xfrm>
-            <a:off x="5430619" y="1588290"/>
-            <a:ext cx="6664519" cy="1150377"/>
+            <a:off x="4454687" y="1588290"/>
+            <a:ext cx="7640451" cy="1150377"/>
           </a:xfrm>
           <a:prstGeom prst="rect">
             <a:avLst/>
@@ -4004,8 +4009,8 @@
           </a:fontRef>
         </p:style>
       </p:cxnSp>
-      <mc:AlternateContent xmlns:mc="http://schemas.openxmlformats.org/markup-compatibility/2006">
-        <mc:Choice xmlns:a14="http://schemas.microsoft.com/office/drawing/2010/main" Requires="a14">
+      <mc:AlternateContent xmlns:mc="http://schemas.openxmlformats.org/markup-compatibility/2006" xmlns:a14="http://schemas.microsoft.com/office/drawing/2010/main">
+        <mc:Choice Requires="a14">
           <p:sp>
             <p:nvSpPr>
               <p:cNvPr id="57" name="TextBox 56">
@@ -4124,7 +4129,7 @@
             </p:txBody>
           </p:sp>
         </mc:Choice>
-        <mc:Fallback>
+        <mc:Fallback xmlns="">
           <p:sp>
             <p:nvSpPr>
               <p:cNvPr id="57" name="TextBox 56">
@@ -4210,8 +4215,8 @@
           </a:fontRef>
         </p:style>
       </p:cxnSp>
-      <mc:AlternateContent xmlns:mc="http://schemas.openxmlformats.org/markup-compatibility/2006">
-        <mc:Choice xmlns:a14="http://schemas.microsoft.com/office/drawing/2010/main" Requires="a14">
+      <mc:AlternateContent xmlns:mc="http://schemas.openxmlformats.org/markup-compatibility/2006" xmlns:a14="http://schemas.microsoft.com/office/drawing/2010/main">
+        <mc:Choice Requires="a14">
           <p:sp>
             <p:nvSpPr>
               <p:cNvPr id="60" name="TextBox 59">
@@ -4265,26 +4270,36 @@
                     <m:sSub>
                       <m:sSubPr>
                         <m:ctrlPr>
-                          <a:rPr lang="en-US" dirty="0"/>
+                          <a:rPr lang="en-US" i="1" dirty="0">
+                            <a:latin typeface="Cambria Math" panose="02040503050406030204" pitchFamily="18" charset="0"/>
+                          </a:rPr>
                         </m:ctrlPr>
                       </m:sSubPr>
                       <m:e>
                         <m:r>
-                          <a:rPr lang="en-US" dirty="0"/>
+                          <a:rPr lang="en-US" dirty="0">
+                            <a:latin typeface="Cambria Math" panose="02040503050406030204" pitchFamily="18" charset="0"/>
+                          </a:rPr>
                           <m:t>𝑥</m:t>
                         </m:r>
                       </m:e>
                       <m:sub>
                         <m:r>
-                          <a:rPr lang="en-US" dirty="0"/>
+                          <a:rPr lang="en-US" dirty="0">
+                            <a:latin typeface="Cambria Math" panose="02040503050406030204" pitchFamily="18" charset="0"/>
+                          </a:rPr>
                           <m:t>𝑘</m:t>
                         </m:r>
                         <m:r>
-                          <a:rPr lang="en-US" dirty="0"/>
+                          <a:rPr lang="en-US" dirty="0">
+                            <a:latin typeface="Cambria Math" panose="02040503050406030204" pitchFamily="18" charset="0"/>
+                          </a:rPr>
                           <m:t>|</m:t>
                         </m:r>
                         <m:r>
-                          <a:rPr lang="en-US" dirty="0"/>
+                          <a:rPr lang="en-US" dirty="0">
+                            <a:latin typeface="Cambria Math" panose="02040503050406030204" pitchFamily="18" charset="0"/>
+                          </a:rPr>
                           <m:t>𝑘</m:t>
                         </m:r>
                       </m:sub>
@@ -4300,26 +4315,36 @@
                     <m:sSub>
                       <m:sSubPr>
                         <m:ctrlPr>
-                          <a:rPr lang="en-US" dirty="0"/>
+                          <a:rPr lang="en-US" i="1" dirty="0">
+                            <a:latin typeface="Cambria Math" panose="02040503050406030204" pitchFamily="18" charset="0"/>
+                          </a:rPr>
                         </m:ctrlPr>
                       </m:sSubPr>
                       <m:e>
                         <m:r>
-                          <a:rPr lang="en-US" dirty="0"/>
+                          <a:rPr lang="en-US" dirty="0">
+                            <a:latin typeface="Cambria Math" panose="02040503050406030204" pitchFamily="18" charset="0"/>
+                          </a:rPr>
                           <m:t>𝑃</m:t>
                         </m:r>
                       </m:e>
                       <m:sub>
                         <m:r>
-                          <a:rPr lang="en-US" dirty="0"/>
+                          <a:rPr lang="en-US" dirty="0">
+                            <a:latin typeface="Cambria Math" panose="02040503050406030204" pitchFamily="18" charset="0"/>
+                          </a:rPr>
                           <m:t>𝑘</m:t>
                         </m:r>
                         <m:r>
-                          <a:rPr lang="en-US" dirty="0"/>
+                          <a:rPr lang="en-US" dirty="0">
+                            <a:latin typeface="Cambria Math" panose="02040503050406030204" pitchFamily="18" charset="0"/>
+                          </a:rPr>
                           <m:t>|</m:t>
                         </m:r>
                         <m:r>
-                          <a:rPr lang="en-US" dirty="0"/>
+                          <a:rPr lang="en-US" dirty="0">
+                            <a:latin typeface="Cambria Math" panose="02040503050406030204" pitchFamily="18" charset="0"/>
+                          </a:rPr>
                           <m:t>𝑘</m:t>
                         </m:r>
                       </m:sub>
@@ -4331,7 +4356,7 @@
             </p:txBody>
           </p:sp>
         </mc:Choice>
-        <mc:Fallback>
+        <mc:Fallback xmlns="">
           <p:sp>
             <p:nvSpPr>
               <p:cNvPr id="60" name="TextBox 59">
@@ -4611,8 +4636,8 @@
           </a:fontRef>
         </p:style>
       </p:cxnSp>
-      <mc:AlternateContent xmlns:mc="http://schemas.openxmlformats.org/markup-compatibility/2006">
-        <mc:Choice xmlns:a14="http://schemas.microsoft.com/office/drawing/2010/main" Requires="a14">
+      <mc:AlternateContent xmlns:mc="http://schemas.openxmlformats.org/markup-compatibility/2006" xmlns:a14="http://schemas.microsoft.com/office/drawing/2010/main">
+        <mc:Choice Requires="a14">
           <p:sp>
             <p:nvSpPr>
               <p:cNvPr id="86" name="TextBox 85">
@@ -4815,7 +4840,7 @@
             </p:txBody>
           </p:sp>
         </mc:Choice>
-        <mc:Fallback>
+        <mc:Fallback xmlns="">
           <p:sp>
             <p:nvSpPr>
               <p:cNvPr id="86" name="TextBox 85">
@@ -4860,8 +4885,8 @@
           </p:sp>
         </mc:Fallback>
       </mc:AlternateContent>
-      <mc:AlternateContent xmlns:mc="http://schemas.openxmlformats.org/markup-compatibility/2006">
-        <mc:Choice xmlns:a14="http://schemas.microsoft.com/office/drawing/2010/main" Requires="a14">
+      <mc:AlternateContent xmlns:mc="http://schemas.openxmlformats.org/markup-compatibility/2006" xmlns:a14="http://schemas.microsoft.com/office/drawing/2010/main">
+        <mc:Choice Requires="a14">
           <p:sp>
             <p:nvSpPr>
               <p:cNvPr id="88" name="TextBox 87">
@@ -5007,7 +5032,7 @@
             </p:txBody>
           </p:sp>
         </mc:Choice>
-        <mc:Fallback>
+        <mc:Fallback xmlns="">
           <p:sp>
             <p:nvSpPr>
               <p:cNvPr id="88" name="TextBox 87">
@@ -5052,8 +5077,8 @@
           </p:sp>
         </mc:Fallback>
       </mc:AlternateContent>
-      <mc:AlternateContent xmlns:mc="http://schemas.openxmlformats.org/markup-compatibility/2006">
-        <mc:Choice xmlns:a14="http://schemas.microsoft.com/office/drawing/2010/main" Requires="a14">
+      <mc:AlternateContent xmlns:mc="http://schemas.openxmlformats.org/markup-compatibility/2006" xmlns:a14="http://schemas.microsoft.com/office/drawing/2010/main">
+        <mc:Choice Requires="a14">
           <p:sp>
             <p:nvSpPr>
               <p:cNvPr id="90" name="TextBox 89">
@@ -5176,13 +5201,7 @@
                           <a:rPr lang="en-US" b="0" i="1" dirty="0" smtClean="0">
                             <a:latin typeface="Cambria Math" panose="02040503050406030204" pitchFamily="18" charset="0"/>
                           </a:rPr>
-                          <m:t>+1</m:t>
-                        </m:r>
-                        <m:r>
-                          <a:rPr lang="en-US" b="0" i="1" dirty="0" smtClean="0">
-                            <a:latin typeface="Cambria Math" panose="02040503050406030204" pitchFamily="18" charset="0"/>
-                          </a:rPr>
-                          <m:t>|</m:t>
+                          <m:t>+1|</m:t>
                         </m:r>
                         <m:r>
                           <a:rPr lang="en-US" b="0" i="1" dirty="0" smtClean="0">
@@ -5202,7 +5221,7 @@
             </p:txBody>
           </p:sp>
         </mc:Choice>
-        <mc:Fallback>
+        <mc:Fallback xmlns="">
           <p:sp>
             <p:nvSpPr>
               <p:cNvPr id="90" name="TextBox 89">
@@ -5486,7 +5505,7 @@
         </p:nvSpPr>
         <p:spPr>
           <a:xfrm>
-            <a:off x="2397334" y="1588290"/>
+            <a:off x="1532536" y="1588289"/>
             <a:ext cx="2505134" cy="1720737"/>
           </a:xfrm>
           <a:prstGeom prst="rect">
@@ -5539,7 +5558,7 @@
         </p:nvSpPr>
         <p:spPr>
           <a:xfrm>
-            <a:off x="2502705" y="3288436"/>
+            <a:off x="1637907" y="3288435"/>
             <a:ext cx="2295172" cy="646331"/>
           </a:xfrm>
           <a:prstGeom prst="rect">
@@ -5664,6 +5683,99 @@
           </a:p>
         </p:txBody>
       </p:sp>
+      <p:sp>
+        <p:nvSpPr>
+          <p:cNvPr id="3" name="TextBox 2">
+            <a:extLst>
+              <a:ext uri="{FF2B5EF4-FFF2-40B4-BE49-F238E27FC236}">
+                <a16:creationId xmlns:a16="http://schemas.microsoft.com/office/drawing/2014/main" id="{FEC497DF-96AA-489A-A46C-398F9D103F62}"/>
+              </a:ext>
+            </a:extLst>
+          </p:cNvPr>
+          <p:cNvSpPr txBox="1"/>
+          <p:nvPr/>
+        </p:nvSpPr>
+        <p:spPr>
+          <a:xfrm>
+            <a:off x="4543867" y="1947108"/>
+            <a:ext cx="746369" cy="369332"/>
+          </a:xfrm>
+          <a:prstGeom prst="rect">
+            <a:avLst/>
+          </a:prstGeom>
+        </p:spPr>
+        <p:style>
+          <a:lnRef idx="2">
+            <a:schemeClr val="accent6">
+              <a:shade val="50000"/>
+            </a:schemeClr>
+          </a:lnRef>
+          <a:fillRef idx="1">
+            <a:schemeClr val="accent6"/>
+          </a:fillRef>
+          <a:effectRef idx="0">
+            <a:schemeClr val="accent6"/>
+          </a:effectRef>
+          <a:fontRef idx="minor">
+            <a:schemeClr val="lt1"/>
+          </a:fontRef>
+        </p:style>
+        <p:txBody>
+          <a:bodyPr wrap="square" rtlCol="0">
+            <a:spAutoFit/>
+          </a:bodyPr>
+          <a:lstStyle/>
+          <a:p>
+            <a:pPr algn="ctr"/>
+            <a:r>
+              <a:rPr lang="en-US" altLang="zh-CN" dirty="0"/>
+              <a:t>Data</a:t>
+            </a:r>
+            <a:endParaRPr lang="en-US" dirty="0"/>
+          </a:p>
+        </p:txBody>
+      </p:sp>
+      <p:cxnSp>
+        <p:nvCxnSpPr>
+          <p:cNvPr id="37" name="Straight Arrow Connector 36">
+            <a:extLst>
+              <a:ext uri="{FF2B5EF4-FFF2-40B4-BE49-F238E27FC236}">
+                <a16:creationId xmlns:a16="http://schemas.microsoft.com/office/drawing/2014/main" id="{92E83DF0-909F-499F-ADDA-5421316C67BC}"/>
+              </a:ext>
+            </a:extLst>
+          </p:cNvPr>
+          <p:cNvCxnSpPr>
+            <a:cxnSpLocks/>
+          </p:cNvCxnSpPr>
+          <p:nvPr/>
+        </p:nvCxnSpPr>
+        <p:spPr>
+          <a:xfrm>
+            <a:off x="5292857" y="2131774"/>
+            <a:ext cx="264008" cy="0"/>
+          </a:xfrm>
+          <a:prstGeom prst="straightConnector1">
+            <a:avLst/>
+          </a:prstGeom>
+          <a:ln>
+            <a:tailEnd type="triangle"/>
+          </a:ln>
+        </p:spPr>
+        <p:style>
+          <a:lnRef idx="3">
+            <a:schemeClr val="accent6"/>
+          </a:lnRef>
+          <a:fillRef idx="0">
+            <a:schemeClr val="accent6"/>
+          </a:fillRef>
+          <a:effectRef idx="2">
+            <a:schemeClr val="accent6"/>
+          </a:effectRef>
+          <a:fontRef idx="minor">
+            <a:schemeClr val="tx1"/>
+          </a:fontRef>
+        </p:style>
+      </p:cxnSp>
     </p:spTree>
     <p:extLst>
       <p:ext uri="{BB962C8B-B14F-4D97-AF65-F5344CB8AC3E}">

</xml_diff>